<commit_message>
Added demo to presentation.
</commit_message>
<xml_diff>
--- a/presentation.pptx
+++ b/presentation.pptx
@@ -5,10 +5,10 @@
     <p:sldMasterId id="2147483672" r:id="rId4"/>
   </p:sldMasterIdLst>
   <p:notesMasterIdLst>
-    <p:notesMasterId r:id="rId20"/>
+    <p:notesMasterId r:id="rId21"/>
   </p:notesMasterIdLst>
   <p:handoutMasterIdLst>
-    <p:handoutMasterId r:id="rId21"/>
+    <p:handoutMasterId r:id="rId22"/>
   </p:handoutMasterIdLst>
   <p:sldIdLst>
     <p:sldId id="257" r:id="rId5"/>
@@ -25,7 +25,8 @@
     <p:sldId id="268" r:id="rId16"/>
     <p:sldId id="269" r:id="rId17"/>
     <p:sldId id="270" r:id="rId18"/>
-    <p:sldId id="271" r:id="rId19"/>
+    <p:sldId id="272" r:id="rId19"/>
+    <p:sldId id="271" r:id="rId20"/>
   </p:sldIdLst>
   <p:sldSz cx="12188825" cy="6858000"/>
   <p:notesSz cx="6858000" cy="9144000"/>
@@ -14142,6 +14143,116 @@
 <file path=ppt/slides/slide15.xml><?xml version="1.0" encoding="utf-8"?>
 <p:sld xmlns:a="http://schemas.openxmlformats.org/drawingml/2006/main" xmlns:r="http://schemas.openxmlformats.org/officeDocument/2006/relationships" xmlns:p="http://schemas.openxmlformats.org/presentationml/2006/main">
   <p:cSld>
+    <p:spTree>
+      <p:nvGrpSpPr>
+        <p:cNvPr id="1" name=""/>
+        <p:cNvGrpSpPr/>
+        <p:nvPr/>
+      </p:nvGrpSpPr>
+      <p:grpSpPr>
+        <a:xfrm>
+          <a:off x="0" y="0"/>
+          <a:ext cx="0" cy="0"/>
+          <a:chOff x="0" y="0"/>
+          <a:chExt cx="0" cy="0"/>
+        </a:xfrm>
+      </p:grpSpPr>
+      <p:sp>
+        <p:nvSpPr>
+          <p:cNvPr id="7" name="Título 6">
+            <a:extLst>
+              <a:ext uri="{FF2B5EF4-FFF2-40B4-BE49-F238E27FC236}">
+                <a16:creationId xmlns:a16="http://schemas.microsoft.com/office/drawing/2014/main" id="{5769BF04-92AF-4827-A699-BF568AB8D8D1}"/>
+              </a:ext>
+            </a:extLst>
+          </p:cNvPr>
+          <p:cNvSpPr>
+            <a:spLocks noGrp="1"/>
+          </p:cNvSpPr>
+          <p:nvPr>
+            <p:ph type="title"/>
+          </p:nvPr>
+        </p:nvSpPr>
+        <p:spPr>
+          <a:xfrm>
+            <a:off x="677159" y="609600"/>
+            <a:ext cx="2203568" cy="4724400"/>
+          </a:xfrm>
+        </p:spPr>
+        <p:txBody>
+          <a:bodyPr anchor="ctr"/>
+          <a:lstStyle/>
+          <a:p>
+            <a:pPr algn="ctr"/>
+            <a:r>
+              <a:rPr lang="es-PE" dirty="0"/>
+              <a:t>Demo</a:t>
+            </a:r>
+          </a:p>
+        </p:txBody>
+      </p:sp>
+      <p:pic>
+        <p:nvPicPr>
+          <p:cNvPr id="9" name="Elementos multimedia en línea 8" title="Camera Calibration using Levenberg-Marquardt algorithm">
+            <a:hlinkClick r:id="" action="ppaction://media"/>
+            <a:extLst>
+              <a:ext uri="{FF2B5EF4-FFF2-40B4-BE49-F238E27FC236}">
+                <a16:creationId xmlns:a16="http://schemas.microsoft.com/office/drawing/2014/main" id="{CB1AA0CC-5A36-436B-A913-750BE7DCED5B}"/>
+              </a:ext>
+            </a:extLst>
+          </p:cNvPr>
+          <p:cNvPicPr>
+            <a:picLocks noGrp="1" noRot="1" noChangeAspect="1"/>
+          </p:cNvPicPr>
+          <p:nvPr>
+            <p:ph idx="1"/>
+            <a:videoFile r:link="rId1"/>
+          </p:nvPr>
+        </p:nvPicPr>
+        <p:blipFill>
+          <a:blip r:embed="rId3"/>
+          <a:stretch>
+            <a:fillRect/>
+          </a:stretch>
+        </p:blipFill>
+        <p:spPr>
+          <a:xfrm>
+            <a:off x="2978679" y="1676400"/>
+            <a:ext cx="6231466" cy="3505200"/>
+          </a:xfrm>
+          <a:prstGeom prst="rect">
+            <a:avLst/>
+          </a:prstGeom>
+        </p:spPr>
+      </p:pic>
+    </p:spTree>
+    <p:extLst>
+      <p:ext uri="{BB962C8B-B14F-4D97-AF65-F5344CB8AC3E}">
+        <p14:creationId xmlns:p14="http://schemas.microsoft.com/office/powerpoint/2010/main" val="1779164783"/>
+      </p:ext>
+    </p:extLst>
+  </p:cSld>
+  <p:clrMapOvr>
+    <a:masterClrMapping/>
+  </p:clrMapOvr>
+  <mc:AlternateContent xmlns:mc="http://schemas.openxmlformats.org/markup-compatibility/2006" xmlns:p14="http://schemas.microsoft.com/office/powerpoint/2010/main">
+    <mc:Choice Requires="p14">
+      <p:transition spd="med" p14:dur="700">
+        <p:fade/>
+      </p:transition>
+    </mc:Choice>
+    <mc:Fallback xmlns="">
+      <p:transition spd="med">
+        <p:fade/>
+      </p:transition>
+    </mc:Fallback>
+  </mc:AlternateContent>
+</p:sld>
+</file>
+
+<file path=ppt/slides/slide16.xml><?xml version="1.0" encoding="utf-8"?>
+<p:sld xmlns:a="http://schemas.openxmlformats.org/drawingml/2006/main" xmlns:r="http://schemas.openxmlformats.org/officeDocument/2006/relationships" xmlns:p="http://schemas.openxmlformats.org/presentationml/2006/main">
+  <p:cSld>
     <p:bg>
       <p:bgPr>
         <a:solidFill>

</xml_diff>